<commit_message>
fixed spelling error and updated resolution on several figures
</commit_message>
<xml_diff>
--- a/Images/Presentation1.pptx
+++ b/Images/Presentation1.pptx
@@ -6,6 +6,7 @@
   </p:sldMasterIdLst>
   <p:sldIdLst>
     <p:sldId id="256" r:id="rId2"/>
+    <p:sldId id="257" r:id="rId3"/>
   </p:sldIdLst>
   <p:sldSz cx="12192000" cy="6858000"/>
   <p:notesSz cx="6858000" cy="9144000"/>
@@ -104,6 +105,11 @@
       </a:defRPr>
     </a:lvl9pPr>
   </p:defaultTextStyle>
+  <p:extLst>
+    <p:ext uri="{EFAFB233-063F-42B5-8137-9DF3F51BA10A}">
+      <p15:sldGuideLst xmlns:p15="http://schemas.microsoft.com/office/powerpoint/2012/main"/>
+    </p:ext>
+  </p:extLst>
 </p:presentation>
 </file>
 
@@ -254,7 +260,7 @@
           <a:p>
             <a:fld id="{DF492C0F-1AA2-4963-995E-C38D0639ED44}" type="datetimeFigureOut">
               <a:rPr lang="en-US" smtClean="0"/>
-              <a:t>7/11/2025</a:t>
+              <a:t>9/4/2025</a:t>
             </a:fld>
             <a:endParaRPr lang="en-US"/>
           </a:p>
@@ -452,7 +458,7 @@
           <a:p>
             <a:fld id="{DF492C0F-1AA2-4963-995E-C38D0639ED44}" type="datetimeFigureOut">
               <a:rPr lang="en-US" smtClean="0"/>
-              <a:t>7/11/2025</a:t>
+              <a:t>9/4/2025</a:t>
             </a:fld>
             <a:endParaRPr lang="en-US"/>
           </a:p>
@@ -660,7 +666,7 @@
           <a:p>
             <a:fld id="{DF492C0F-1AA2-4963-995E-C38D0639ED44}" type="datetimeFigureOut">
               <a:rPr lang="en-US" smtClean="0"/>
-              <a:t>7/11/2025</a:t>
+              <a:t>9/4/2025</a:t>
             </a:fld>
             <a:endParaRPr lang="en-US"/>
           </a:p>
@@ -858,7 +864,7 @@
           <a:p>
             <a:fld id="{DF492C0F-1AA2-4963-995E-C38D0639ED44}" type="datetimeFigureOut">
               <a:rPr lang="en-US" smtClean="0"/>
-              <a:t>7/11/2025</a:t>
+              <a:t>9/4/2025</a:t>
             </a:fld>
             <a:endParaRPr lang="en-US"/>
           </a:p>
@@ -1133,7 +1139,7 @@
           <a:p>
             <a:fld id="{DF492C0F-1AA2-4963-995E-C38D0639ED44}" type="datetimeFigureOut">
               <a:rPr lang="en-US" smtClean="0"/>
-              <a:t>7/11/2025</a:t>
+              <a:t>9/4/2025</a:t>
             </a:fld>
             <a:endParaRPr lang="en-US"/>
           </a:p>
@@ -1398,7 +1404,7 @@
           <a:p>
             <a:fld id="{DF492C0F-1AA2-4963-995E-C38D0639ED44}" type="datetimeFigureOut">
               <a:rPr lang="en-US" smtClean="0"/>
-              <a:t>7/11/2025</a:t>
+              <a:t>9/4/2025</a:t>
             </a:fld>
             <a:endParaRPr lang="en-US"/>
           </a:p>
@@ -1810,7 +1816,7 @@
           <a:p>
             <a:fld id="{DF492C0F-1AA2-4963-995E-C38D0639ED44}" type="datetimeFigureOut">
               <a:rPr lang="en-US" smtClean="0"/>
-              <a:t>7/11/2025</a:t>
+              <a:t>9/4/2025</a:t>
             </a:fld>
             <a:endParaRPr lang="en-US"/>
           </a:p>
@@ -1951,7 +1957,7 @@
           <a:p>
             <a:fld id="{DF492C0F-1AA2-4963-995E-C38D0639ED44}" type="datetimeFigureOut">
               <a:rPr lang="en-US" smtClean="0"/>
-              <a:t>7/11/2025</a:t>
+              <a:t>9/4/2025</a:t>
             </a:fld>
             <a:endParaRPr lang="en-US"/>
           </a:p>
@@ -2064,7 +2070,7 @@
           <a:p>
             <a:fld id="{DF492C0F-1AA2-4963-995E-C38D0639ED44}" type="datetimeFigureOut">
               <a:rPr lang="en-US" smtClean="0"/>
-              <a:t>7/11/2025</a:t>
+              <a:t>9/4/2025</a:t>
             </a:fld>
             <a:endParaRPr lang="en-US"/>
           </a:p>
@@ -2375,7 +2381,7 @@
           <a:p>
             <a:fld id="{DF492C0F-1AA2-4963-995E-C38D0639ED44}" type="datetimeFigureOut">
               <a:rPr lang="en-US" smtClean="0"/>
-              <a:t>7/11/2025</a:t>
+              <a:t>9/4/2025</a:t>
             </a:fld>
             <a:endParaRPr lang="en-US"/>
           </a:p>
@@ -2663,7 +2669,7 @@
           <a:p>
             <a:fld id="{DF492C0F-1AA2-4963-995E-C38D0639ED44}" type="datetimeFigureOut">
               <a:rPr lang="en-US" smtClean="0"/>
-              <a:t>7/11/2025</a:t>
+              <a:t>9/4/2025</a:t>
             </a:fld>
             <a:endParaRPr lang="en-US"/>
           </a:p>
@@ -2904,7 +2910,7 @@
           <a:p>
             <a:fld id="{DF492C0F-1AA2-4963-995E-C38D0639ED44}" type="datetimeFigureOut">
               <a:rPr lang="en-US" smtClean="0"/>
-              <a:t>7/11/2025</a:t>
+              <a:t>9/4/2025</a:t>
             </a:fld>
             <a:endParaRPr lang="en-US"/>
           </a:p>
@@ -3685,6 +3691,387 @@
 </p:sld>
 </file>
 
+<file path=ppt/slides/slide2.xml><?xml version="1.0" encoding="utf-8"?>
+<p:sld xmlns:a="http://schemas.openxmlformats.org/drawingml/2006/main" xmlns:r="http://schemas.openxmlformats.org/officeDocument/2006/relationships" xmlns:p="http://schemas.openxmlformats.org/presentationml/2006/main">
+  <p:cSld>
+    <p:spTree>
+      <p:nvGrpSpPr>
+        <p:cNvPr id="1" name=""/>
+        <p:cNvGrpSpPr/>
+        <p:nvPr/>
+      </p:nvGrpSpPr>
+      <p:grpSpPr>
+        <a:xfrm>
+          <a:off x="0" y="0"/>
+          <a:ext cx="0" cy="0"/>
+          <a:chOff x="0" y="0"/>
+          <a:chExt cx="0" cy="0"/>
+        </a:xfrm>
+      </p:grpSpPr>
+      <p:grpSp>
+        <p:nvGrpSpPr>
+          <p:cNvPr id="4" name="Group 3">
+            <a:extLst>
+              <a:ext uri="{FF2B5EF4-FFF2-40B4-BE49-F238E27FC236}">
+                <a16:creationId xmlns:a16="http://schemas.microsoft.com/office/drawing/2014/main" id="{A35BA0E2-FB51-4F13-9057-293DDA160E79}"/>
+              </a:ext>
+            </a:extLst>
+          </p:cNvPr>
+          <p:cNvGrpSpPr/>
+          <p:nvPr/>
+        </p:nvGrpSpPr>
+        <p:grpSpPr>
+          <a:xfrm>
+            <a:off x="3369733" y="0"/>
+            <a:ext cx="8822267" cy="6857999"/>
+            <a:chOff x="3369733" y="0"/>
+            <a:chExt cx="8822267" cy="6857999"/>
+          </a:xfrm>
+        </p:grpSpPr>
+        <p:pic>
+          <p:nvPicPr>
+            <p:cNvPr id="5" name="Picture 4">
+              <a:extLst>
+                <a:ext uri="{FF2B5EF4-FFF2-40B4-BE49-F238E27FC236}">
+                  <a16:creationId xmlns:a16="http://schemas.microsoft.com/office/drawing/2014/main" id="{F4D85C8F-0CBB-49C4-B21C-BEFC86EA63A9}"/>
+                </a:ext>
+              </a:extLst>
+            </p:cNvPr>
+            <p:cNvPicPr>
+              <a:picLocks noChangeAspect="1"/>
+            </p:cNvPicPr>
+            <p:nvPr/>
+          </p:nvPicPr>
+          <p:blipFill>
+            <a:blip r:embed="rId2">
+              <a:extLst>
+                <a:ext uri="{28A0092B-C50C-407E-A947-70E740481C1C}">
+                  <a14:useLocalDpi xmlns:a14="http://schemas.microsoft.com/office/drawing/2010/main" val="0"/>
+                </a:ext>
+              </a:extLst>
+            </a:blip>
+            <a:stretch>
+              <a:fillRect/>
+            </a:stretch>
+          </p:blipFill>
+          <p:spPr>
+            <a:xfrm>
+              <a:off x="3619501" y="0"/>
+              <a:ext cx="8572499" cy="6857999"/>
+            </a:xfrm>
+            <a:prstGeom prst="rect">
+              <a:avLst/>
+            </a:prstGeom>
+          </p:spPr>
+        </p:pic>
+        <p:grpSp>
+          <p:nvGrpSpPr>
+            <p:cNvPr id="13" name="Group 12">
+              <a:extLst>
+                <a:ext uri="{FF2B5EF4-FFF2-40B4-BE49-F238E27FC236}">
+                  <a16:creationId xmlns:a16="http://schemas.microsoft.com/office/drawing/2014/main" id="{EE058527-2145-43D2-AF30-ADFBC3FBD8AB}"/>
+                </a:ext>
+              </a:extLst>
+            </p:cNvPr>
+            <p:cNvGrpSpPr/>
+            <p:nvPr/>
+          </p:nvGrpSpPr>
+          <p:grpSpPr>
+            <a:xfrm>
+              <a:off x="3369733" y="1718732"/>
+              <a:ext cx="1769534" cy="3814001"/>
+              <a:chOff x="3369733" y="1718732"/>
+              <a:chExt cx="1769534" cy="3814001"/>
+            </a:xfrm>
+          </p:grpSpPr>
+          <p:sp>
+            <p:nvSpPr>
+              <p:cNvPr id="6" name="Left Brace 5">
+                <a:extLst>
+                  <a:ext uri="{FF2B5EF4-FFF2-40B4-BE49-F238E27FC236}">
+                    <a16:creationId xmlns:a16="http://schemas.microsoft.com/office/drawing/2014/main" id="{92EAF16C-8CF9-4120-93AF-C8341459107A}"/>
+                  </a:ext>
+                </a:extLst>
+              </p:cNvPr>
+              <p:cNvSpPr/>
+              <p:nvPr/>
+            </p:nvSpPr>
+            <p:spPr>
+              <a:xfrm>
+                <a:off x="4885267" y="1718732"/>
+                <a:ext cx="254000" cy="1710267"/>
+              </a:xfrm>
+              <a:prstGeom prst="leftBrace">
+                <a:avLst>
+                  <a:gd name="adj1" fmla="val 80341"/>
+                  <a:gd name="adj2" fmla="val 50000"/>
+                </a:avLst>
+              </a:prstGeom>
+              <a:noFill/>
+              <a:ln w="28575">
+                <a:solidFill>
+                  <a:schemeClr val="tx1"/>
+                </a:solidFill>
+              </a:ln>
+            </p:spPr>
+            <p:style>
+              <a:lnRef idx="1">
+                <a:schemeClr val="accent1"/>
+              </a:lnRef>
+              <a:fillRef idx="0">
+                <a:schemeClr val="accent1"/>
+              </a:fillRef>
+              <a:effectRef idx="0">
+                <a:schemeClr val="accent1"/>
+              </a:effectRef>
+              <a:fontRef idx="minor">
+                <a:schemeClr val="tx1"/>
+              </a:fontRef>
+            </p:style>
+            <p:txBody>
+              <a:bodyPr rtlCol="0" anchor="ctr"/>
+              <a:lstStyle/>
+              <a:p>
+                <a:pPr algn="ctr"/>
+                <a:endParaRPr lang="en-US"/>
+              </a:p>
+            </p:txBody>
+          </p:sp>
+          <p:sp>
+            <p:nvSpPr>
+              <p:cNvPr id="7" name="TextBox 6">
+                <a:extLst>
+                  <a:ext uri="{FF2B5EF4-FFF2-40B4-BE49-F238E27FC236}">
+                    <a16:creationId xmlns:a16="http://schemas.microsoft.com/office/drawing/2014/main" id="{43E7B64A-987A-4049-83E8-2F78B99FDC60}"/>
+                  </a:ext>
+                </a:extLst>
+              </p:cNvPr>
+              <p:cNvSpPr txBox="1"/>
+              <p:nvPr/>
+            </p:nvSpPr>
+            <p:spPr>
+              <a:xfrm>
+                <a:off x="3805775" y="2419976"/>
+                <a:ext cx="1168400" cy="307777"/>
+              </a:xfrm>
+              <a:prstGeom prst="rect">
+                <a:avLst/>
+              </a:prstGeom>
+              <a:noFill/>
+            </p:spPr>
+            <p:txBody>
+              <a:bodyPr wrap="square" rtlCol="0">
+                <a:spAutoFit/>
+              </a:bodyPr>
+              <a:lstStyle/>
+              <a:p>
+                <a:r>
+                  <a:rPr lang="en-US" sz="1400" dirty="0">
+                    <a:latin typeface="Helvetica" panose="020B0604020202020204" pitchFamily="34" charset="0"/>
+                    <a:cs typeface="Helvetica" panose="020B0604020202020204" pitchFamily="34" charset="0"/>
+                  </a:rPr>
+                  <a:t>Scale type</a:t>
+                </a:r>
+              </a:p>
+            </p:txBody>
+          </p:sp>
+          <p:sp>
+            <p:nvSpPr>
+              <p:cNvPr id="8" name="Left Brace 7">
+                <a:extLst>
+                  <a:ext uri="{FF2B5EF4-FFF2-40B4-BE49-F238E27FC236}">
+                    <a16:creationId xmlns:a16="http://schemas.microsoft.com/office/drawing/2014/main" id="{0BD6AF95-EB95-4327-88FF-0F5B4606C30C}"/>
+                  </a:ext>
+                </a:extLst>
+              </p:cNvPr>
+              <p:cNvSpPr/>
+              <p:nvPr/>
+            </p:nvSpPr>
+            <p:spPr>
+              <a:xfrm>
+                <a:off x="4766741" y="3818467"/>
+                <a:ext cx="207434" cy="635000"/>
+              </a:xfrm>
+              <a:prstGeom prst="leftBrace">
+                <a:avLst>
+                  <a:gd name="adj1" fmla="val 25000"/>
+                  <a:gd name="adj2" fmla="val 50000"/>
+                </a:avLst>
+              </a:prstGeom>
+              <a:noFill/>
+              <a:ln w="28575">
+                <a:solidFill>
+                  <a:schemeClr val="tx1"/>
+                </a:solidFill>
+              </a:ln>
+            </p:spPr>
+            <p:style>
+              <a:lnRef idx="1">
+                <a:schemeClr val="accent1"/>
+              </a:lnRef>
+              <a:fillRef idx="0">
+                <a:schemeClr val="accent1"/>
+              </a:fillRef>
+              <a:effectRef idx="0">
+                <a:schemeClr val="accent1"/>
+              </a:effectRef>
+              <a:fontRef idx="minor">
+                <a:schemeClr val="tx1"/>
+              </a:fontRef>
+            </p:style>
+            <p:txBody>
+              <a:bodyPr rtlCol="0" anchor="ctr"/>
+              <a:lstStyle/>
+              <a:p>
+                <a:pPr algn="ctr"/>
+                <a:endParaRPr lang="en-US"/>
+              </a:p>
+            </p:txBody>
+          </p:sp>
+          <p:sp>
+            <p:nvSpPr>
+              <p:cNvPr id="9" name="TextBox 8">
+                <a:extLst>
+                  <a:ext uri="{FF2B5EF4-FFF2-40B4-BE49-F238E27FC236}">
+                    <a16:creationId xmlns:a16="http://schemas.microsoft.com/office/drawing/2014/main" id="{7B446F12-EBE5-41AE-9308-A91DAB38BDF4}"/>
+                  </a:ext>
+                </a:extLst>
+              </p:cNvPr>
+              <p:cNvSpPr txBox="1"/>
+              <p:nvPr/>
+            </p:nvSpPr>
+            <p:spPr>
+              <a:xfrm>
+                <a:off x="3716867" y="3868633"/>
+                <a:ext cx="1168400" cy="523220"/>
+              </a:xfrm>
+              <a:prstGeom prst="rect">
+                <a:avLst/>
+              </a:prstGeom>
+              <a:noFill/>
+            </p:spPr>
+            <p:txBody>
+              <a:bodyPr wrap="square" rtlCol="0">
+                <a:spAutoFit/>
+              </a:bodyPr>
+              <a:lstStyle/>
+              <a:p>
+                <a:r>
+                  <a:rPr lang="en-US" sz="1400" dirty="0">
+                    <a:latin typeface="Helvetica" panose="020B0604020202020204" pitchFamily="34" charset="0"/>
+                    <a:cs typeface="Helvetica" panose="020B0604020202020204" pitchFamily="34" charset="0"/>
+                  </a:rPr>
+                  <a:t>Schooling behavior</a:t>
+                </a:r>
+              </a:p>
+            </p:txBody>
+          </p:sp>
+          <p:sp>
+            <p:nvSpPr>
+              <p:cNvPr id="10" name="TextBox 9">
+                <a:extLst>
+                  <a:ext uri="{FF2B5EF4-FFF2-40B4-BE49-F238E27FC236}">
+                    <a16:creationId xmlns:a16="http://schemas.microsoft.com/office/drawing/2014/main" id="{EF5D0BD4-9A07-4E33-A727-6BAA0198E988}"/>
+                  </a:ext>
+                </a:extLst>
+              </p:cNvPr>
+              <p:cNvSpPr txBox="1"/>
+              <p:nvPr/>
+            </p:nvSpPr>
+            <p:spPr>
+              <a:xfrm>
+                <a:off x="3369733" y="4933202"/>
+                <a:ext cx="1500725" cy="523220"/>
+              </a:xfrm>
+              <a:prstGeom prst="rect">
+                <a:avLst/>
+              </a:prstGeom>
+              <a:noFill/>
+            </p:spPr>
+            <p:txBody>
+              <a:bodyPr wrap="square" rtlCol="0">
+                <a:spAutoFit/>
+              </a:bodyPr>
+              <a:lstStyle/>
+              <a:p>
+                <a:r>
+                  <a:rPr lang="en-US" sz="1400" dirty="0">
+                    <a:latin typeface="Helvetica" panose="020B0604020202020204" pitchFamily="34" charset="0"/>
+                    <a:cs typeface="Helvetica" panose="020B0604020202020204" pitchFamily="34" charset="0"/>
+                  </a:rPr>
+                  <a:t>Position-in-water-column</a:t>
+                </a:r>
+              </a:p>
+            </p:txBody>
+          </p:sp>
+          <p:sp>
+            <p:nvSpPr>
+              <p:cNvPr id="12" name="Left Brace 11">
+                <a:extLst>
+                  <a:ext uri="{FF2B5EF4-FFF2-40B4-BE49-F238E27FC236}">
+                    <a16:creationId xmlns:a16="http://schemas.microsoft.com/office/drawing/2014/main" id="{C547E4E0-FE65-488C-B551-885270EE7BF5}"/>
+                  </a:ext>
+                </a:extLst>
+              </p:cNvPr>
+              <p:cNvSpPr/>
+              <p:nvPr/>
+            </p:nvSpPr>
+            <p:spPr>
+              <a:xfrm>
+                <a:off x="4646091" y="4856891"/>
+                <a:ext cx="207434" cy="675842"/>
+              </a:xfrm>
+              <a:prstGeom prst="leftBrace">
+                <a:avLst>
+                  <a:gd name="adj1" fmla="val 25000"/>
+                  <a:gd name="adj2" fmla="val 50000"/>
+                </a:avLst>
+              </a:prstGeom>
+              <a:noFill/>
+              <a:ln w="28575">
+                <a:solidFill>
+                  <a:schemeClr val="tx1"/>
+                </a:solidFill>
+              </a:ln>
+            </p:spPr>
+            <p:style>
+              <a:lnRef idx="1">
+                <a:schemeClr val="accent1"/>
+              </a:lnRef>
+              <a:fillRef idx="0">
+                <a:schemeClr val="accent1"/>
+              </a:fillRef>
+              <a:effectRef idx="0">
+                <a:schemeClr val="accent1"/>
+              </a:effectRef>
+              <a:fontRef idx="minor">
+                <a:schemeClr val="tx1"/>
+              </a:fontRef>
+            </p:style>
+            <p:txBody>
+              <a:bodyPr rtlCol="0" anchor="ctr"/>
+              <a:lstStyle/>
+              <a:p>
+                <a:pPr algn="ctr"/>
+                <a:endParaRPr lang="en-US"/>
+              </a:p>
+            </p:txBody>
+          </p:sp>
+        </p:grpSp>
+      </p:grpSp>
+    </p:spTree>
+    <p:extLst>
+      <p:ext uri="{BB962C8B-B14F-4D97-AF65-F5344CB8AC3E}">
+        <p14:creationId xmlns:p14="http://schemas.microsoft.com/office/powerpoint/2010/main" val="3713036456"/>
+      </p:ext>
+    </p:extLst>
+  </p:cSld>
+  <p:clrMapOvr>
+    <a:masterClrMapping/>
+  </p:clrMapOvr>
+</p:sld>
+</file>
+
 <file path=ppt/theme/theme1.xml><?xml version="1.0" encoding="utf-8"?>
 <a:theme xmlns:a="http://schemas.openxmlformats.org/drawingml/2006/main" name="Office Theme">
   <a:themeElements>

</xml_diff>

<commit_message>
adjusted images for fig 5
</commit_message>
<xml_diff>
--- a/Images/Presentation1.pptx
+++ b/Images/Presentation1.pptx
@@ -260,7 +260,7 @@
           <a:p>
             <a:fld id="{DF492C0F-1AA2-4963-995E-C38D0639ED44}" type="datetimeFigureOut">
               <a:rPr lang="en-US" smtClean="0"/>
-              <a:t>9/4/2025</a:t>
+              <a:t>9/15/2025</a:t>
             </a:fld>
             <a:endParaRPr lang="en-US"/>
           </a:p>
@@ -458,7 +458,7 @@
           <a:p>
             <a:fld id="{DF492C0F-1AA2-4963-995E-C38D0639ED44}" type="datetimeFigureOut">
               <a:rPr lang="en-US" smtClean="0"/>
-              <a:t>9/4/2025</a:t>
+              <a:t>9/15/2025</a:t>
             </a:fld>
             <a:endParaRPr lang="en-US"/>
           </a:p>
@@ -666,7 +666,7 @@
           <a:p>
             <a:fld id="{DF492C0F-1AA2-4963-995E-C38D0639ED44}" type="datetimeFigureOut">
               <a:rPr lang="en-US" smtClean="0"/>
-              <a:t>9/4/2025</a:t>
+              <a:t>9/15/2025</a:t>
             </a:fld>
             <a:endParaRPr lang="en-US"/>
           </a:p>
@@ -864,7 +864,7 @@
           <a:p>
             <a:fld id="{DF492C0F-1AA2-4963-995E-C38D0639ED44}" type="datetimeFigureOut">
               <a:rPr lang="en-US" smtClean="0"/>
-              <a:t>9/4/2025</a:t>
+              <a:t>9/15/2025</a:t>
             </a:fld>
             <a:endParaRPr lang="en-US"/>
           </a:p>
@@ -1139,7 +1139,7 @@
           <a:p>
             <a:fld id="{DF492C0F-1AA2-4963-995E-C38D0639ED44}" type="datetimeFigureOut">
               <a:rPr lang="en-US" smtClean="0"/>
-              <a:t>9/4/2025</a:t>
+              <a:t>9/15/2025</a:t>
             </a:fld>
             <a:endParaRPr lang="en-US"/>
           </a:p>
@@ -1404,7 +1404,7 @@
           <a:p>
             <a:fld id="{DF492C0F-1AA2-4963-995E-C38D0639ED44}" type="datetimeFigureOut">
               <a:rPr lang="en-US" smtClean="0"/>
-              <a:t>9/4/2025</a:t>
+              <a:t>9/15/2025</a:t>
             </a:fld>
             <a:endParaRPr lang="en-US"/>
           </a:p>
@@ -1816,7 +1816,7 @@
           <a:p>
             <a:fld id="{DF492C0F-1AA2-4963-995E-C38D0639ED44}" type="datetimeFigureOut">
               <a:rPr lang="en-US" smtClean="0"/>
-              <a:t>9/4/2025</a:t>
+              <a:t>9/15/2025</a:t>
             </a:fld>
             <a:endParaRPr lang="en-US"/>
           </a:p>
@@ -1957,7 +1957,7 @@
           <a:p>
             <a:fld id="{DF492C0F-1AA2-4963-995E-C38D0639ED44}" type="datetimeFigureOut">
               <a:rPr lang="en-US" smtClean="0"/>
-              <a:t>9/4/2025</a:t>
+              <a:t>9/15/2025</a:t>
             </a:fld>
             <a:endParaRPr lang="en-US"/>
           </a:p>
@@ -2070,7 +2070,7 @@
           <a:p>
             <a:fld id="{DF492C0F-1AA2-4963-995E-C38D0639ED44}" type="datetimeFigureOut">
               <a:rPr lang="en-US" smtClean="0"/>
-              <a:t>9/4/2025</a:t>
+              <a:t>9/15/2025</a:t>
             </a:fld>
             <a:endParaRPr lang="en-US"/>
           </a:p>
@@ -2381,7 +2381,7 @@
           <a:p>
             <a:fld id="{DF492C0F-1AA2-4963-995E-C38D0639ED44}" type="datetimeFigureOut">
               <a:rPr lang="en-US" smtClean="0"/>
-              <a:t>9/4/2025</a:t>
+              <a:t>9/15/2025</a:t>
             </a:fld>
             <a:endParaRPr lang="en-US"/>
           </a:p>
@@ -2669,7 +2669,7 @@
           <a:p>
             <a:fld id="{DF492C0F-1AA2-4963-995E-C38D0639ED44}" type="datetimeFigureOut">
               <a:rPr lang="en-US" smtClean="0"/>
-              <a:t>9/4/2025</a:t>
+              <a:t>9/15/2025</a:t>
             </a:fld>
             <a:endParaRPr lang="en-US"/>
           </a:p>
@@ -2910,7 +2910,7 @@
           <a:p>
             <a:fld id="{DF492C0F-1AA2-4963-995E-C38D0639ED44}" type="datetimeFigureOut">
               <a:rPr lang="en-US" smtClean="0"/>
-              <a:t>9/4/2025</a:t>
+              <a:t>9/15/2025</a:t>
             </a:fld>
             <a:endParaRPr lang="en-US"/>
           </a:p>
@@ -3329,10 +3329,10 @@
       </p:grpSpPr>
       <p:grpSp>
         <p:nvGrpSpPr>
-          <p:cNvPr id="14" name="Group 13">
-            <a:extLst>
-              <a:ext uri="{FF2B5EF4-FFF2-40B4-BE49-F238E27FC236}">
-                <a16:creationId xmlns:a16="http://schemas.microsoft.com/office/drawing/2014/main" id="{EA84B09D-03FF-458A-A3AE-44860E1A2FE1}"/>
+          <p:cNvPr id="2" name="Group 1">
+            <a:extLst>
+              <a:ext uri="{FF2B5EF4-FFF2-40B4-BE49-F238E27FC236}">
+                <a16:creationId xmlns:a16="http://schemas.microsoft.com/office/drawing/2014/main" id="{FF68E998-C04D-4912-B470-4B3064E5FBAC}"/>
               </a:ext>
             </a:extLst>
           </p:cNvPr>
@@ -3341,11 +3341,14 @@
         </p:nvGrpSpPr>
         <p:grpSpPr>
           <a:xfrm>
-            <a:off x="3369733" y="0"/>
-            <a:ext cx="8822267" cy="6858000"/>
-            <a:chOff x="3369733" y="0"/>
-            <a:chExt cx="8822267" cy="6858000"/>
+            <a:off x="3056467" y="0"/>
+            <a:ext cx="9135533" cy="6858000"/>
+            <a:chOff x="3056467" y="0"/>
+            <a:chExt cx="9135533" cy="6858000"/>
           </a:xfrm>
+          <a:solidFill>
+            <a:schemeClr val="bg1"/>
+          </a:solidFill>
         </p:grpSpPr>
         <p:pic>
           <p:nvPicPr>
@@ -3361,7 +3364,7 @@
             </p:cNvPicPr>
             <p:nvPr/>
           </p:nvPicPr>
-          <p:blipFill>
+          <p:blipFill rotWithShape="1">
             <a:blip r:embed="rId2">
               <a:extLst>
                 <a:ext uri="{28A0092B-C50C-407E-A947-70E740481C1C}">
@@ -3369,18 +3372,18 @@
                 </a:ext>
               </a:extLst>
             </a:blip>
-            <a:stretch>
-              <a:fillRect/>
-            </a:stretch>
+            <a:srcRect l="-6568" r="-2"/>
+            <a:stretch/>
           </p:blipFill>
           <p:spPr>
             <a:xfrm>
-              <a:off x="3619501" y="0"/>
-              <a:ext cx="8572499" cy="6858000"/>
+              <a:off x="3056467" y="0"/>
+              <a:ext cx="9135533" cy="6858000"/>
             </a:xfrm>
             <a:prstGeom prst="rect">
               <a:avLst/>
             </a:prstGeom>
+            <a:grpFill/>
           </p:spPr>
         </p:pic>
         <p:grpSp>
@@ -3397,65 +3400,13 @@
           </p:nvGrpSpPr>
           <p:grpSpPr>
             <a:xfrm>
-              <a:off x="3369733" y="1718732"/>
-              <a:ext cx="1769534" cy="3814001"/>
-              <a:chOff x="3369733" y="1718732"/>
-              <a:chExt cx="1769534" cy="3814001"/>
+              <a:off x="3276604" y="1718732"/>
+              <a:ext cx="1862663" cy="3814001"/>
+              <a:chOff x="3276604" y="1718732"/>
+              <a:chExt cx="1862663" cy="3814001"/>
             </a:xfrm>
+            <a:grpFill/>
           </p:grpSpPr>
-          <p:sp>
-            <p:nvSpPr>
-              <p:cNvPr id="6" name="Left Brace 5">
-                <a:extLst>
-                  <a:ext uri="{FF2B5EF4-FFF2-40B4-BE49-F238E27FC236}">
-                    <a16:creationId xmlns:a16="http://schemas.microsoft.com/office/drawing/2014/main" id="{92EAF16C-8CF9-4120-93AF-C8341459107A}"/>
-                  </a:ext>
-                </a:extLst>
-              </p:cNvPr>
-              <p:cNvSpPr/>
-              <p:nvPr/>
-            </p:nvSpPr>
-            <p:spPr>
-              <a:xfrm>
-                <a:off x="4885267" y="1718732"/>
-                <a:ext cx="254000" cy="1710267"/>
-              </a:xfrm>
-              <a:prstGeom prst="leftBrace">
-                <a:avLst>
-                  <a:gd name="adj1" fmla="val 80341"/>
-                  <a:gd name="adj2" fmla="val 50000"/>
-                </a:avLst>
-              </a:prstGeom>
-              <a:noFill/>
-              <a:ln w="28575">
-                <a:solidFill>
-                  <a:schemeClr val="tx1"/>
-                </a:solidFill>
-              </a:ln>
-            </p:spPr>
-            <p:style>
-              <a:lnRef idx="1">
-                <a:schemeClr val="accent1"/>
-              </a:lnRef>
-              <a:fillRef idx="0">
-                <a:schemeClr val="accent1"/>
-              </a:fillRef>
-              <a:effectRef idx="0">
-                <a:schemeClr val="accent1"/>
-              </a:effectRef>
-              <a:fontRef idx="minor">
-                <a:schemeClr val="tx1"/>
-              </a:fontRef>
-            </p:style>
-            <p:txBody>
-              <a:bodyPr rtlCol="0" anchor="ctr"/>
-              <a:lstStyle/>
-              <a:p>
-                <a:pPr algn="ctr"/>
-                <a:endParaRPr lang="en-US"/>
-              </a:p>
-            </p:txBody>
-          </p:sp>
           <p:sp>
             <p:nvSpPr>
               <p:cNvPr id="7" name="TextBox 6">
@@ -3476,7 +3427,7 @@
               <a:prstGeom prst="rect">
                 <a:avLst/>
               </a:prstGeom>
-              <a:noFill/>
+              <a:grpFill/>
             </p:spPr>
             <p:txBody>
               <a:bodyPr wrap="square" rtlCol="0">
@@ -3491,59 +3442,6 @@
                   </a:rPr>
                   <a:t>Scale type</a:t>
                 </a:r>
-              </a:p>
-            </p:txBody>
-          </p:sp>
-          <p:sp>
-            <p:nvSpPr>
-              <p:cNvPr id="8" name="Left Brace 7">
-                <a:extLst>
-                  <a:ext uri="{FF2B5EF4-FFF2-40B4-BE49-F238E27FC236}">
-                    <a16:creationId xmlns:a16="http://schemas.microsoft.com/office/drawing/2014/main" id="{0BD6AF95-EB95-4327-88FF-0F5B4606C30C}"/>
-                  </a:ext>
-                </a:extLst>
-              </p:cNvPr>
-              <p:cNvSpPr/>
-              <p:nvPr/>
-            </p:nvSpPr>
-            <p:spPr>
-              <a:xfrm>
-                <a:off x="4766741" y="3818467"/>
-                <a:ext cx="207434" cy="635000"/>
-              </a:xfrm>
-              <a:prstGeom prst="leftBrace">
-                <a:avLst>
-                  <a:gd name="adj1" fmla="val 25000"/>
-                  <a:gd name="adj2" fmla="val 50000"/>
-                </a:avLst>
-              </a:prstGeom>
-              <a:noFill/>
-              <a:ln w="28575">
-                <a:solidFill>
-                  <a:schemeClr val="tx1"/>
-                </a:solidFill>
-              </a:ln>
-            </p:spPr>
-            <p:style>
-              <a:lnRef idx="1">
-                <a:schemeClr val="accent1"/>
-              </a:lnRef>
-              <a:fillRef idx="0">
-                <a:schemeClr val="accent1"/>
-              </a:fillRef>
-              <a:effectRef idx="0">
-                <a:schemeClr val="accent1"/>
-              </a:effectRef>
-              <a:fontRef idx="minor">
-                <a:schemeClr val="tx1"/>
-              </a:fontRef>
-            </p:style>
-            <p:txBody>
-              <a:bodyPr rtlCol="0" anchor="ctr"/>
-              <a:lstStyle/>
-              <a:p>
-                <a:pPr algn="ctr"/>
-                <a:endParaRPr lang="en-US"/>
               </a:p>
             </p:txBody>
           </p:sp>
@@ -3567,7 +3465,7 @@
               <a:prstGeom prst="rect">
                 <a:avLst/>
               </a:prstGeom>
-              <a:noFill/>
+              <a:grpFill/>
             </p:spPr>
             <p:txBody>
               <a:bodyPr wrap="square" rtlCol="0">
@@ -3599,13 +3497,13 @@
             </p:nvSpPr>
             <p:spPr>
               <a:xfrm>
-                <a:off x="3369733" y="4933202"/>
+                <a:off x="3276604" y="4933202"/>
                 <a:ext cx="1500725" cy="523220"/>
               </a:xfrm>
               <a:prstGeom prst="rect">
                 <a:avLst/>
               </a:prstGeom>
-              <a:noFill/>
+              <a:grpFill/>
             </p:spPr>
             <p:txBody>
               <a:bodyPr wrap="square" rtlCol="0">
@@ -3646,7 +3544,113 @@
                   <a:gd name="adj2" fmla="val 50000"/>
                 </a:avLst>
               </a:prstGeom>
-              <a:noFill/>
+              <a:grpFill/>
+              <a:ln w="28575">
+                <a:solidFill>
+                  <a:schemeClr val="tx1"/>
+                </a:solidFill>
+              </a:ln>
+            </p:spPr>
+            <p:style>
+              <a:lnRef idx="1">
+                <a:schemeClr val="accent1"/>
+              </a:lnRef>
+              <a:fillRef idx="0">
+                <a:schemeClr val="accent1"/>
+              </a:fillRef>
+              <a:effectRef idx="0">
+                <a:schemeClr val="accent1"/>
+              </a:effectRef>
+              <a:fontRef idx="minor">
+                <a:schemeClr val="tx1"/>
+              </a:fontRef>
+            </p:style>
+            <p:txBody>
+              <a:bodyPr rtlCol="0" anchor="ctr"/>
+              <a:lstStyle/>
+              <a:p>
+                <a:pPr algn="ctr"/>
+                <a:endParaRPr lang="en-US"/>
+              </a:p>
+            </p:txBody>
+          </p:sp>
+          <p:sp>
+            <p:nvSpPr>
+              <p:cNvPr id="8" name="Left Brace 7">
+                <a:extLst>
+                  <a:ext uri="{FF2B5EF4-FFF2-40B4-BE49-F238E27FC236}">
+                    <a16:creationId xmlns:a16="http://schemas.microsoft.com/office/drawing/2014/main" id="{0BD6AF95-EB95-4327-88FF-0F5B4606C30C}"/>
+                  </a:ext>
+                </a:extLst>
+              </p:cNvPr>
+              <p:cNvSpPr/>
+              <p:nvPr/>
+            </p:nvSpPr>
+            <p:spPr>
+              <a:xfrm>
+                <a:off x="4766741" y="3818467"/>
+                <a:ext cx="207434" cy="635000"/>
+              </a:xfrm>
+              <a:prstGeom prst="leftBrace">
+                <a:avLst>
+                  <a:gd name="adj1" fmla="val 25000"/>
+                  <a:gd name="adj2" fmla="val 50000"/>
+                </a:avLst>
+              </a:prstGeom>
+              <a:grpFill/>
+              <a:ln w="28575">
+                <a:solidFill>
+                  <a:schemeClr val="tx1"/>
+                </a:solidFill>
+              </a:ln>
+            </p:spPr>
+            <p:style>
+              <a:lnRef idx="1">
+                <a:schemeClr val="accent1"/>
+              </a:lnRef>
+              <a:fillRef idx="0">
+                <a:schemeClr val="accent1"/>
+              </a:fillRef>
+              <a:effectRef idx="0">
+                <a:schemeClr val="accent1"/>
+              </a:effectRef>
+              <a:fontRef idx="minor">
+                <a:schemeClr val="tx1"/>
+              </a:fontRef>
+            </p:style>
+            <p:txBody>
+              <a:bodyPr rtlCol="0" anchor="ctr"/>
+              <a:lstStyle/>
+              <a:p>
+                <a:pPr algn="ctr"/>
+                <a:endParaRPr lang="en-US"/>
+              </a:p>
+            </p:txBody>
+          </p:sp>
+          <p:sp>
+            <p:nvSpPr>
+              <p:cNvPr id="6" name="Left Brace 5">
+                <a:extLst>
+                  <a:ext uri="{FF2B5EF4-FFF2-40B4-BE49-F238E27FC236}">
+                    <a16:creationId xmlns:a16="http://schemas.microsoft.com/office/drawing/2014/main" id="{92EAF16C-8CF9-4120-93AF-C8341459107A}"/>
+                  </a:ext>
+                </a:extLst>
+              </p:cNvPr>
+              <p:cNvSpPr/>
+              <p:nvPr/>
+            </p:nvSpPr>
+            <p:spPr>
+              <a:xfrm>
+                <a:off x="4885267" y="1718732"/>
+                <a:ext cx="254000" cy="1710267"/>
+              </a:xfrm>
+              <a:prstGeom prst="leftBrace">
+                <a:avLst>
+                  <a:gd name="adj1" fmla="val 80341"/>
+                  <a:gd name="adj2" fmla="val 50000"/>
+                </a:avLst>
+              </a:prstGeom>
+              <a:grpFill/>
               <a:ln w="28575">
                 <a:solidFill>
                   <a:schemeClr val="tx1"/>

</xml_diff>